<commit_message>
coupon code added done
</commit_message>
<xml_diff>
--- a/needs/user-manual.pptx
+++ b/needs/user-manual.pptx
@@ -7,6 +7,7 @@
   <p:sldIdLst>
     <p:sldId id="256" r:id="rId2"/>
     <p:sldId id="257" r:id="rId3"/>
+    <p:sldId id="258" r:id="rId4"/>
   </p:sldIdLst>
   <p:sldSz cx="12192000" cy="6858000"/>
   <p:notesSz cx="6858000" cy="9144000"/>
@@ -105,6 +106,11 @@
       </a:defRPr>
     </a:lvl9pPr>
   </p:defaultTextStyle>
+  <p:extLst>
+    <p:ext uri="{EFAFB233-063F-42B5-8137-9DF3F51BA10A}">
+      <p15:sldGuideLst xmlns:p15="http://schemas.microsoft.com/office/powerpoint/2012/main"/>
+    </p:ext>
+  </p:extLst>
 </p:presentation>
 </file>
 
@@ -443,7 +449,7 @@
           <a:p>
             <a:fld id="{DFE14307-A522-4915-AEC0-193695CD2D78}" type="datetimeFigureOut">
               <a:rPr lang="en-US" smtClean="0"/>
-              <a:t>12/27/2023</a:t>
+              <a:t>12/31/2023</a:t>
             </a:fld>
             <a:endParaRPr lang="en-US"/>
           </a:p>
@@ -1531,7 +1537,7 @@
           <a:p>
             <a:fld id="{DFE14307-A522-4915-AEC0-193695CD2D78}" type="datetimeFigureOut">
               <a:rPr lang="en-US" smtClean="0"/>
-              <a:t>12/27/2023</a:t>
+              <a:t>12/31/2023</a:t>
             </a:fld>
             <a:endParaRPr lang="en-US"/>
           </a:p>
@@ -2511,7 +2517,7 @@
           <a:p>
             <a:fld id="{DFE14307-A522-4915-AEC0-193695CD2D78}" type="datetimeFigureOut">
               <a:rPr lang="en-US" smtClean="0"/>
-              <a:t>12/27/2023</a:t>
+              <a:t>12/31/2023</a:t>
             </a:fld>
             <a:endParaRPr lang="en-US"/>
           </a:p>
@@ -3645,7 +3651,7 @@
           <a:p>
             <a:fld id="{DFE14307-A522-4915-AEC0-193695CD2D78}" type="datetimeFigureOut">
               <a:rPr lang="en-US" smtClean="0"/>
-              <a:t>12/27/2023</a:t>
+              <a:t>12/31/2023</a:t>
             </a:fld>
             <a:endParaRPr lang="en-US"/>
           </a:p>
@@ -4678,7 +4684,7 @@
           <a:p>
             <a:fld id="{DFE14307-A522-4915-AEC0-193695CD2D78}" type="datetimeFigureOut">
               <a:rPr lang="en-US" smtClean="0"/>
-              <a:t>12/27/2023</a:t>
+              <a:t>12/31/2023</a:t>
             </a:fld>
             <a:endParaRPr lang="en-US"/>
           </a:p>
@@ -5338,7 +5344,7 @@
           <a:p>
             <a:fld id="{DFE14307-A522-4915-AEC0-193695CD2D78}" type="datetimeFigureOut">
               <a:rPr lang="en-US" smtClean="0"/>
-              <a:t>12/27/2023</a:t>
+              <a:t>12/31/2023</a:t>
             </a:fld>
             <a:endParaRPr lang="en-US"/>
           </a:p>
@@ -6199,7 +6205,7 @@
           <a:p>
             <a:fld id="{DFE14307-A522-4915-AEC0-193695CD2D78}" type="datetimeFigureOut">
               <a:rPr lang="en-US" smtClean="0"/>
-              <a:t>12/27/2023</a:t>
+              <a:t>12/31/2023</a:t>
             </a:fld>
             <a:endParaRPr lang="en-US"/>
           </a:p>
@@ -6389,7 +6395,7 @@
           <a:p>
             <a:fld id="{DFE14307-A522-4915-AEC0-193695CD2D78}" type="datetimeFigureOut">
               <a:rPr lang="en-US" smtClean="0"/>
-              <a:t>12/27/2023</a:t>
+              <a:t>12/31/2023</a:t>
             </a:fld>
             <a:endParaRPr lang="en-US"/>
           </a:p>
@@ -7361,7 +7367,7 @@
           <a:p>
             <a:fld id="{DFE14307-A522-4915-AEC0-193695CD2D78}" type="datetimeFigureOut">
               <a:rPr lang="en-US" smtClean="0"/>
-              <a:t>12/27/2023</a:t>
+              <a:t>12/31/2023</a:t>
             </a:fld>
             <a:endParaRPr lang="en-US"/>
           </a:p>
@@ -7572,7 +7578,7 @@
           <a:p>
             <a:fld id="{DFE14307-A522-4915-AEC0-193695CD2D78}" type="datetimeFigureOut">
               <a:rPr lang="en-US" smtClean="0"/>
-              <a:t>12/27/2023</a:t>
+              <a:t>12/31/2023</a:t>
             </a:fld>
             <a:endParaRPr lang="en-US"/>
           </a:p>
@@ -8606,7 +8612,7 @@
           <a:p>
             <a:fld id="{DFE14307-A522-4915-AEC0-193695CD2D78}" type="datetimeFigureOut">
               <a:rPr lang="en-US" smtClean="0"/>
-              <a:t>12/27/2023</a:t>
+              <a:t>12/31/2023</a:t>
             </a:fld>
             <a:endParaRPr lang="en-US"/>
           </a:p>
@@ -8878,7 +8884,7 @@
           <a:p>
             <a:fld id="{DFE14307-A522-4915-AEC0-193695CD2D78}" type="datetimeFigureOut">
               <a:rPr lang="en-US" smtClean="0"/>
-              <a:t>12/27/2023</a:t>
+              <a:t>12/31/2023</a:t>
             </a:fld>
             <a:endParaRPr lang="en-US"/>
           </a:p>
@@ -9288,7 +9294,7 @@
           <a:p>
             <a:fld id="{DFE14307-A522-4915-AEC0-193695CD2D78}" type="datetimeFigureOut">
               <a:rPr lang="en-US" smtClean="0"/>
-              <a:t>12/27/2023</a:t>
+              <a:t>12/31/2023</a:t>
             </a:fld>
             <a:endParaRPr lang="en-US"/>
           </a:p>
@@ -9415,7 +9421,7 @@
           <a:p>
             <a:fld id="{DFE14307-A522-4915-AEC0-193695CD2D78}" type="datetimeFigureOut">
               <a:rPr lang="en-US" smtClean="0"/>
-              <a:t>12/27/2023</a:t>
+              <a:t>12/31/2023</a:t>
             </a:fld>
             <a:endParaRPr lang="en-US"/>
           </a:p>
@@ -9510,7 +9516,7 @@
           <a:p>
             <a:fld id="{DFE14307-A522-4915-AEC0-193695CD2D78}" type="datetimeFigureOut">
               <a:rPr lang="en-US" smtClean="0"/>
-              <a:t>12/27/2023</a:t>
+              <a:t>12/31/2023</a:t>
             </a:fld>
             <a:endParaRPr lang="en-US"/>
           </a:p>
@@ -10591,7 +10597,7 @@
           <a:p>
             <a:fld id="{DFE14307-A522-4915-AEC0-193695CD2D78}" type="datetimeFigureOut">
               <a:rPr lang="en-US" smtClean="0"/>
-              <a:t>12/27/2023</a:t>
+              <a:t>12/31/2023</a:t>
             </a:fld>
             <a:endParaRPr lang="en-US"/>
           </a:p>
@@ -11699,7 +11705,7 @@
           <a:p>
             <a:fld id="{DFE14307-A522-4915-AEC0-193695CD2D78}" type="datetimeFigureOut">
               <a:rPr lang="en-US" smtClean="0"/>
-              <a:t>12/27/2023</a:t>
+              <a:t>12/31/2023</a:t>
             </a:fld>
             <a:endParaRPr lang="en-US"/>
           </a:p>
@@ -12696,7 +12702,7 @@
           <a:p>
             <a:fld id="{DFE14307-A522-4915-AEC0-193695CD2D78}" type="datetimeFigureOut">
               <a:rPr lang="en-US" smtClean="0"/>
-              <a:t>12/27/2023</a:t>
+              <a:t>12/31/2023</a:t>
             </a:fld>
             <a:endParaRPr lang="en-US"/>
           </a:p>
@@ -13775,16 +13781,7 @@
                   <a:schemeClr val="accent4"/>
                 </a:solidFill>
               </a:rPr>
-              <a:t>7. To make upcoming product please, click on feature product </a:t>
-            </a:r>
-            <a:r>
-              <a:rPr lang="en-US" b="1" smtClean="0">
-                <a:ln/>
-                <a:solidFill>
-                  <a:schemeClr val="accent4"/>
-                </a:solidFill>
-              </a:rPr>
-              <a:t>and give a date.</a:t>
+              <a:t>7. To make upcoming product please, click on feature product and give a date.</a:t>
             </a:r>
             <a:endParaRPr lang="en-US" b="1" dirty="0">
               <a:ln/>
@@ -13799,6 +13796,468 @@
     <p:extLst>
       <p:ext uri="{BB962C8B-B14F-4D97-AF65-F5344CB8AC3E}">
         <p14:creationId xmlns:p14="http://schemas.microsoft.com/office/powerpoint/2010/main" val="2774382609"/>
+      </p:ext>
+    </p:extLst>
+  </p:cSld>
+  <p:clrMapOvr>
+    <a:masterClrMapping/>
+  </p:clrMapOvr>
+  <p:timing>
+    <p:tnLst>
+      <p:par>
+        <p:cTn id="1" dur="indefinite" restart="never" nodeType="tmRoot"/>
+      </p:par>
+    </p:tnLst>
+  </p:timing>
+</p:sld>
+</file>
+
+<file path=ppt/slides/slide3.xml><?xml version="1.0" encoding="utf-8"?>
+<p:sld xmlns:a="http://schemas.openxmlformats.org/drawingml/2006/main" xmlns:r="http://schemas.openxmlformats.org/officeDocument/2006/relationships" xmlns:p="http://schemas.openxmlformats.org/presentationml/2006/main">
+  <p:cSld>
+    <p:spTree>
+      <p:nvGrpSpPr>
+        <p:cNvPr id="1" name=""/>
+        <p:cNvGrpSpPr/>
+        <p:nvPr/>
+      </p:nvGrpSpPr>
+      <p:grpSpPr>
+        <a:xfrm>
+          <a:off x="0" y="0"/>
+          <a:ext cx="0" cy="0"/>
+          <a:chOff x="0" y="0"/>
+          <a:chExt cx="0" cy="0"/>
+        </a:xfrm>
+      </p:grpSpPr>
+      <p:sp>
+        <p:nvSpPr>
+          <p:cNvPr id="2" name="Title 1"/>
+          <p:cNvSpPr>
+            <a:spLocks noGrp="1"/>
+          </p:cNvSpPr>
+          <p:nvPr>
+            <p:ph type="ctrTitle"/>
+          </p:nvPr>
+        </p:nvSpPr>
+        <p:spPr>
+          <a:xfrm>
+            <a:off x="997299" y="633539"/>
+            <a:ext cx="10133155" cy="540992"/>
+          </a:xfrm>
+        </p:spPr>
+        <p:txBody>
+          <a:bodyPr/>
+          <a:lstStyle/>
+          <a:p>
+            <a:pPr algn="ctr"/>
+            <a:r>
+              <a:rPr lang="en-US" sz="3200" u="sng" dirty="0" smtClean="0">
+                <a:solidFill>
+                  <a:srgbClr val="FF00FF"/>
+                </a:solidFill>
+              </a:rPr>
+              <a:t>Rules </a:t>
+            </a:r>
+            <a:r>
+              <a:rPr lang="en-US" sz="3200" u="sng" dirty="0" smtClean="0">
+                <a:solidFill>
+                  <a:srgbClr val="FF00FF"/>
+                </a:solidFill>
+              </a:rPr>
+              <a:t>for Order</a:t>
+            </a:r>
+            <a:endParaRPr lang="en-US" sz="3200" u="sng" dirty="0">
+              <a:solidFill>
+                <a:srgbClr val="FF00FF"/>
+              </a:solidFill>
+            </a:endParaRPr>
+          </a:p>
+        </p:txBody>
+      </p:sp>
+      <p:sp>
+        <p:nvSpPr>
+          <p:cNvPr id="4" name="TextBox 3"/>
+          <p:cNvSpPr txBox="1"/>
+          <p:nvPr/>
+        </p:nvSpPr>
+        <p:spPr>
+          <a:xfrm>
+            <a:off x="709448" y="1433928"/>
+            <a:ext cx="10850615" cy="4524315"/>
+          </a:xfrm>
+          <a:prstGeom prst="rect">
+            <a:avLst/>
+          </a:prstGeom>
+        </p:spPr>
+        <p:style>
+          <a:lnRef idx="0">
+            <a:schemeClr val="accent5"/>
+          </a:lnRef>
+          <a:fillRef idx="1002">
+            <a:schemeClr val="dk2"/>
+          </a:fillRef>
+          <a:effectRef idx="3">
+            <a:schemeClr val="accent5"/>
+          </a:effectRef>
+          <a:fontRef idx="minor">
+            <a:schemeClr val="lt1"/>
+          </a:fontRef>
+        </p:style>
+        <p:txBody>
+          <a:bodyPr wrap="square" rtlCol="0">
+            <a:spAutoFit/>
+            <a:scene3d>
+              <a:camera prst="orthographicFront"/>
+              <a:lightRig rig="soft" dir="t">
+                <a:rot lat="0" lon="0" rev="15600000"/>
+              </a:lightRig>
+            </a:scene3d>
+            <a:sp3d extrusionH="57150" prstMaterial="softEdge">
+              <a:bevelT w="25400" h="38100"/>
+            </a:sp3d>
+          </a:bodyPr>
+          <a:lstStyle/>
+          <a:p>
+            <a:r>
+              <a:rPr lang="en-US" b="1" dirty="0" smtClean="0">
+                <a:ln/>
+                <a:solidFill>
+                  <a:schemeClr val="accent4"/>
+                </a:solidFill>
+              </a:rPr>
+              <a:t>1.Only 5 field have to fill up ( Title, Price, Stock, Photo, Final Price)</a:t>
+            </a:r>
+          </a:p>
+          <a:p>
+            <a:r>
+              <a:rPr lang="en-US" b="1" dirty="0" smtClean="0">
+                <a:ln/>
+                <a:solidFill>
+                  <a:schemeClr val="accent4"/>
+                </a:solidFill>
+              </a:rPr>
+              <a:t>2. Final Price field is filled automatically, if you want to change in any purpose (like round figure),       you can change it.</a:t>
+            </a:r>
+          </a:p>
+          <a:p>
+            <a:r>
+              <a:rPr lang="en-US" b="1" dirty="0" smtClean="0">
+                <a:ln/>
+                <a:solidFill>
+                  <a:schemeClr val="accent4"/>
+                </a:solidFill>
+              </a:rPr>
+              <a:t>3. In description and summery field there are options for designing the font, text, paragraph, headline and many others. Another important option: You can design any description in Microsoft word, copy this and paste in the description, summery </a:t>
+            </a:r>
+          </a:p>
+          <a:p>
+            <a:r>
+              <a:rPr lang="en-US" b="1" dirty="0" smtClean="0">
+                <a:ln/>
+                <a:solidFill>
+                  <a:schemeClr val="accent4"/>
+                </a:solidFill>
+              </a:rPr>
+              <a:t>4. Before Add product please, check these attributes : Brand, Category, Subcategory, Processor Model, Processor Generation, Display Size, Display Type, Ram, SSD, HDD, </a:t>
+            </a:r>
+            <a:r>
+              <a:rPr lang="en-US" b="1" dirty="0">
+                <a:ln/>
+                <a:solidFill>
+                  <a:schemeClr val="accent4"/>
+                </a:solidFill>
+              </a:rPr>
+              <a:t>Graphic </a:t>
+            </a:r>
+            <a:r>
+              <a:rPr lang="en-US" b="1" dirty="0" smtClean="0">
+                <a:ln/>
+                <a:solidFill>
+                  <a:schemeClr val="accent4"/>
+                </a:solidFill>
+              </a:rPr>
+              <a:t>Attributes &gt; Capacity.</a:t>
+            </a:r>
+          </a:p>
+          <a:p>
+            <a:r>
+              <a:rPr lang="en-US" b="1" dirty="0" smtClean="0">
+                <a:ln/>
+                <a:solidFill>
+                  <a:schemeClr val="accent4"/>
+                </a:solidFill>
+              </a:rPr>
+              <a:t>5. All product fields are grouped in some points. These are General Attributes, Processor Attributes, </a:t>
+            </a:r>
+            <a:r>
+              <a:rPr lang="en-US" b="1" dirty="0">
+                <a:ln/>
+                <a:solidFill>
+                  <a:schemeClr val="accent4"/>
+                </a:solidFill>
+              </a:rPr>
+              <a:t>Display </a:t>
+            </a:r>
+            <a:r>
+              <a:rPr lang="en-US" b="1" dirty="0" smtClean="0">
+                <a:ln/>
+                <a:solidFill>
+                  <a:schemeClr val="accent4"/>
+                </a:solidFill>
+              </a:rPr>
+              <a:t>Attributes, </a:t>
+            </a:r>
+            <a:r>
+              <a:rPr lang="en-US" b="1" dirty="0">
+                <a:ln/>
+                <a:solidFill>
+                  <a:schemeClr val="accent4"/>
+                </a:solidFill>
+              </a:rPr>
+              <a:t>Memory </a:t>
+            </a:r>
+            <a:r>
+              <a:rPr lang="en-US" b="1" dirty="0" smtClean="0">
+                <a:ln/>
+                <a:solidFill>
+                  <a:schemeClr val="accent4"/>
+                </a:solidFill>
+              </a:rPr>
+              <a:t>Attributes, </a:t>
+            </a:r>
+            <a:r>
+              <a:rPr lang="en-US" b="1" dirty="0">
+                <a:ln/>
+                <a:solidFill>
+                  <a:schemeClr val="accent4"/>
+                </a:solidFill>
+              </a:rPr>
+              <a:t>Storage </a:t>
+            </a:r>
+            <a:r>
+              <a:rPr lang="en-US" b="1" dirty="0" smtClean="0">
+                <a:ln/>
+                <a:solidFill>
+                  <a:schemeClr val="accent4"/>
+                </a:solidFill>
+              </a:rPr>
+              <a:t>Attributes, </a:t>
+            </a:r>
+            <a:r>
+              <a:rPr lang="en-US" b="1" dirty="0">
+                <a:ln/>
+                <a:solidFill>
+                  <a:schemeClr val="accent4"/>
+                </a:solidFill>
+              </a:rPr>
+              <a:t>Graphic </a:t>
+            </a:r>
+            <a:r>
+              <a:rPr lang="en-US" b="1" dirty="0" smtClean="0">
+                <a:ln/>
+                <a:solidFill>
+                  <a:schemeClr val="accent4"/>
+                </a:solidFill>
+              </a:rPr>
+              <a:t>Attributes, </a:t>
+            </a:r>
+            <a:r>
+              <a:rPr lang="en-US" b="1" dirty="0">
+                <a:ln/>
+                <a:solidFill>
+                  <a:schemeClr val="accent4"/>
+                </a:solidFill>
+              </a:rPr>
+              <a:t>Keyboard &amp; Touchpad </a:t>
+            </a:r>
+            <a:r>
+              <a:rPr lang="en-US" b="1" dirty="0" smtClean="0">
+                <a:ln/>
+                <a:solidFill>
+                  <a:schemeClr val="accent4"/>
+                </a:solidFill>
+              </a:rPr>
+              <a:t>Attributes, </a:t>
+            </a:r>
+            <a:r>
+              <a:rPr lang="en-US" b="1" dirty="0">
+                <a:ln/>
+                <a:solidFill>
+                  <a:schemeClr val="accent4"/>
+                </a:solidFill>
+              </a:rPr>
+              <a:t>Camera &amp; Audio </a:t>
+            </a:r>
+            <a:r>
+              <a:rPr lang="en-US" b="1" dirty="0" smtClean="0">
+                <a:ln/>
+                <a:solidFill>
+                  <a:schemeClr val="accent4"/>
+                </a:solidFill>
+              </a:rPr>
+              <a:t>Attributes, </a:t>
+            </a:r>
+            <a:r>
+              <a:rPr lang="en-US" b="1" dirty="0">
+                <a:ln/>
+                <a:solidFill>
+                  <a:schemeClr val="accent4"/>
+                </a:solidFill>
+              </a:rPr>
+              <a:t>Port &amp; Slots </a:t>
+            </a:r>
+            <a:r>
+              <a:rPr lang="en-US" b="1" dirty="0" smtClean="0">
+                <a:ln/>
+                <a:solidFill>
+                  <a:schemeClr val="accent4"/>
+                </a:solidFill>
+              </a:rPr>
+              <a:t>Attributes, </a:t>
+            </a:r>
+            <a:r>
+              <a:rPr lang="en-US" b="1" dirty="0">
+                <a:ln/>
+                <a:solidFill>
+                  <a:schemeClr val="accent4"/>
+                </a:solidFill>
+              </a:rPr>
+              <a:t>Network &amp; Connectivity </a:t>
+            </a:r>
+            <a:r>
+              <a:rPr lang="en-US" b="1" dirty="0" smtClean="0">
+                <a:ln/>
+                <a:solidFill>
+                  <a:schemeClr val="accent4"/>
+                </a:solidFill>
+              </a:rPr>
+              <a:t>Attributes, </a:t>
+            </a:r>
+            <a:r>
+              <a:rPr lang="en-US" b="1" dirty="0">
+                <a:ln/>
+                <a:solidFill>
+                  <a:schemeClr val="accent4"/>
+                </a:solidFill>
+              </a:rPr>
+              <a:t>Security </a:t>
+            </a:r>
+            <a:r>
+              <a:rPr lang="en-US" b="1" dirty="0" smtClean="0">
+                <a:ln/>
+                <a:solidFill>
+                  <a:schemeClr val="accent4"/>
+                </a:solidFill>
+              </a:rPr>
+              <a:t>Attributes, </a:t>
+            </a:r>
+            <a:r>
+              <a:rPr lang="en-US" b="1" dirty="0">
+                <a:ln/>
+                <a:solidFill>
+                  <a:schemeClr val="accent4"/>
+                </a:solidFill>
+              </a:rPr>
+              <a:t>Software </a:t>
+            </a:r>
+            <a:r>
+              <a:rPr lang="en-US" b="1" dirty="0" smtClean="0">
+                <a:ln/>
+                <a:solidFill>
+                  <a:schemeClr val="accent4"/>
+                </a:solidFill>
+              </a:rPr>
+              <a:t>Attributes, </a:t>
+            </a:r>
+            <a:r>
+              <a:rPr lang="en-US" b="1" dirty="0">
+                <a:ln/>
+                <a:solidFill>
+                  <a:schemeClr val="accent4"/>
+                </a:solidFill>
+              </a:rPr>
+              <a:t>Power </a:t>
+            </a:r>
+            <a:r>
+              <a:rPr lang="en-US" b="1" dirty="0" smtClean="0">
+                <a:ln/>
+                <a:solidFill>
+                  <a:schemeClr val="accent4"/>
+                </a:solidFill>
+              </a:rPr>
+              <a:t>Attributes, </a:t>
+            </a:r>
+            <a:r>
+              <a:rPr lang="en-US" b="1" dirty="0">
+                <a:ln/>
+                <a:solidFill>
+                  <a:schemeClr val="accent4"/>
+                </a:solidFill>
+              </a:rPr>
+              <a:t>Physical Specification </a:t>
+            </a:r>
+            <a:r>
+              <a:rPr lang="en-US" b="1" dirty="0" smtClean="0">
+                <a:ln/>
+                <a:solidFill>
+                  <a:schemeClr val="accent4"/>
+                </a:solidFill>
+              </a:rPr>
+              <a:t>Attributes, </a:t>
+            </a:r>
+            <a:r>
+              <a:rPr lang="en-US" b="1" dirty="0">
+                <a:ln/>
+                <a:solidFill>
+                  <a:schemeClr val="accent4"/>
+                </a:solidFill>
+              </a:rPr>
+              <a:t>Warranty </a:t>
+            </a:r>
+            <a:r>
+              <a:rPr lang="en-US" b="1" dirty="0" smtClean="0">
+                <a:ln/>
+                <a:solidFill>
+                  <a:schemeClr val="accent4"/>
+                </a:solidFill>
+              </a:rPr>
+              <a:t>Attributes, Installment.</a:t>
+            </a:r>
+          </a:p>
+          <a:p>
+            <a:r>
+              <a:rPr lang="en-US" b="1" dirty="0" smtClean="0">
+                <a:ln/>
+                <a:solidFill>
+                  <a:schemeClr val="accent4"/>
+                </a:solidFill>
+              </a:rPr>
+              <a:t>6. To make feature product please, click on feature product attribute</a:t>
+            </a:r>
+          </a:p>
+          <a:p>
+            <a:r>
+              <a:rPr lang="en-US" b="1" dirty="0" smtClean="0">
+                <a:ln/>
+                <a:solidFill>
+                  <a:schemeClr val="accent4"/>
+                </a:solidFill>
+              </a:rPr>
+              <a:t>7. To make upcoming product please, click on feature product and give a date.</a:t>
+            </a:r>
+            <a:endParaRPr lang="en-US" b="1" dirty="0">
+              <a:ln/>
+              <a:solidFill>
+                <a:schemeClr val="accent4"/>
+              </a:solidFill>
+            </a:endParaRPr>
+          </a:p>
+        </p:txBody>
+      </p:sp>
+    </p:spTree>
+    <p:extLst>
+      <p:ext uri="{BB962C8B-B14F-4D97-AF65-F5344CB8AC3E}">
+        <p14:creationId xmlns:p14="http://schemas.microsoft.com/office/powerpoint/2010/main" val="3632223958"/>
       </p:ext>
     </p:extLst>
   </p:cSld>

</xml_diff>

<commit_message>
logo hide in mail
</commit_message>
<xml_diff>
--- a/needs/user-manual.pptx
+++ b/needs/user-manual.pptx
@@ -14526,34 +14526,16 @@
               <a:buAutoNum type="arabicPeriod"/>
             </a:pPr>
             <a:r>
-              <a:rPr lang="en-US" b="1" smtClean="0">
-                <a:ln/>
-                <a:solidFill>
-                  <a:schemeClr val="bg1"/>
-                </a:solidFill>
-              </a:rPr>
-              <a:t>Stock </a:t>
-            </a:r>
-            <a:r>
               <a:rPr lang="en-US" b="1" dirty="0" smtClean="0">
                 <a:ln/>
                 <a:solidFill>
                   <a:schemeClr val="bg1"/>
                 </a:solidFill>
               </a:rPr>
-              <a:t>management depend on </a:t>
-            </a:r>
-            <a:r>
-              <a:rPr lang="en-US" b="1" smtClean="0">
-                <a:ln/>
-                <a:solidFill>
-                  <a:schemeClr val="bg1"/>
-                </a:solidFill>
-              </a:rPr>
-              <a:t>payment status</a:t>
-            </a:r>
-            <a:r>
-              <a:rPr lang="en-US" b="1" smtClean="0">
+              <a:t>Stock management depend on payment status</a:t>
+            </a:r>
+            <a:r>
+              <a:rPr lang="en-US" b="1" dirty="0" smtClean="0">
                 <a:ln/>
                 <a:solidFill>
                   <a:schemeClr val="bg1"/>

</xml_diff>